<commit_message>
En esta aplicación se encuentra el primer ejercicio de la construccion de un TDA. usando elementos EOA
</commit_message>
<xml_diff>
--- a/Estructura de Datos Clase 1.pptx
+++ b/Estructura de Datos Clase 1.pptx
@@ -326,7 +326,7 @@
           <a:p>
             <a:fld id="{96DFF08F-DC6B-4601-B491-B0F83F6DD2DA}" type="datetimeFigureOut">
               <a:rPr lang="en-US" smtClean="0"/>
-              <a:t>9/6/2018</a:t>
+              <a:t>9/12/2018</a:t>
             </a:fld>
             <a:endParaRPr lang="en-US" dirty="0"/>
           </a:p>
@@ -665,7 +665,7 @@
             <a:fld id="{96DFF08F-DC6B-4601-B491-B0F83F6DD2DA}" type="datetimeFigureOut">
               <a:rPr lang="en-US" smtClean="0"/>
               <a:pPr/>
-              <a:t>9/6/2018</a:t>
+              <a:t>9/12/2018</a:t>
             </a:fld>
             <a:endParaRPr lang="en-US" dirty="0"/>
           </a:p>
@@ -1068,7 +1068,7 @@
             <a:fld id="{96DFF08F-DC6B-4601-B491-B0F83F6DD2DA}" type="datetimeFigureOut">
               <a:rPr lang="en-US" smtClean="0"/>
               <a:pPr/>
-              <a:t>9/6/2018</a:t>
+              <a:t>9/12/2018</a:t>
             </a:fld>
             <a:endParaRPr lang="en-US" dirty="0"/>
           </a:p>
@@ -1406,7 +1406,7 @@
             <a:fld id="{96DFF08F-DC6B-4601-B491-B0F83F6DD2DA}" type="datetimeFigureOut">
               <a:rPr lang="en-US" smtClean="0"/>
               <a:pPr/>
-              <a:t>9/6/2018</a:t>
+              <a:t>9/12/2018</a:t>
             </a:fld>
             <a:endParaRPr lang="en-US" dirty="0"/>
           </a:p>
@@ -1728,7 +1728,7 @@
             <a:fld id="{96DFF08F-DC6B-4601-B491-B0F83F6DD2DA}" type="datetimeFigureOut">
               <a:rPr lang="en-US" smtClean="0"/>
               <a:pPr/>
-              <a:t>9/6/2018</a:t>
+              <a:t>9/12/2018</a:t>
             </a:fld>
             <a:endParaRPr lang="en-US" dirty="0"/>
           </a:p>
@@ -2126,7 +2126,7 @@
             <a:fld id="{96DFF08F-DC6B-4601-B491-B0F83F6DD2DA}" type="datetimeFigureOut">
               <a:rPr lang="en-US" smtClean="0"/>
               <a:pPr/>
-              <a:t>9/6/2018</a:t>
+              <a:t>9/12/2018</a:t>
             </a:fld>
             <a:endParaRPr lang="en-US" dirty="0"/>
           </a:p>
@@ -2384,7 +2384,7 @@
           <a:p>
             <a:fld id="{96DFF08F-DC6B-4601-B491-B0F83F6DD2DA}" type="datetimeFigureOut">
               <a:rPr lang="en-US" smtClean="0"/>
-              <a:t>9/6/2018</a:t>
+              <a:t>9/12/2018</a:t>
             </a:fld>
             <a:endParaRPr lang="en-US" dirty="0"/>
           </a:p>
@@ -2646,7 +2646,7 @@
           <a:p>
             <a:fld id="{96DFF08F-DC6B-4601-B491-B0F83F6DD2DA}" type="datetimeFigureOut">
               <a:rPr lang="en-US" smtClean="0"/>
-              <a:t>9/6/2018</a:t>
+              <a:t>9/12/2018</a:t>
             </a:fld>
             <a:endParaRPr lang="en-US" dirty="0"/>
           </a:p>
@@ -2908,7 +2908,7 @@
           <a:p>
             <a:fld id="{96DFF08F-DC6B-4601-B491-B0F83F6DD2DA}" type="datetimeFigureOut">
               <a:rPr lang="en-US" smtClean="0"/>
-              <a:t>9/6/2018</a:t>
+              <a:t>9/12/2018</a:t>
             </a:fld>
             <a:endParaRPr lang="en-US" dirty="0"/>
           </a:p>
@@ -3238,7 +3238,7 @@
             <a:fld id="{96DFF08F-DC6B-4601-B491-B0F83F6DD2DA}" type="datetimeFigureOut">
               <a:rPr lang="en-US" smtClean="0"/>
               <a:pPr/>
-              <a:t>9/6/2018</a:t>
+              <a:t>9/12/2018</a:t>
             </a:fld>
             <a:endParaRPr lang="en-US" dirty="0"/>
           </a:p>
@@ -3562,7 +3562,7 @@
           <a:p>
             <a:fld id="{96DFF08F-DC6B-4601-B491-B0F83F6DD2DA}" type="datetimeFigureOut">
               <a:rPr lang="en-US" smtClean="0"/>
-              <a:t>9/6/2018</a:t>
+              <a:t>9/12/2018</a:t>
             </a:fld>
             <a:endParaRPr lang="en-US" dirty="0"/>
           </a:p>
@@ -4019,7 +4019,7 @@
           <a:p>
             <a:fld id="{96DFF08F-DC6B-4601-B491-B0F83F6DD2DA}" type="datetimeFigureOut">
               <a:rPr lang="en-US" smtClean="0"/>
-              <a:t>9/6/2018</a:t>
+              <a:t>9/12/2018</a:t>
             </a:fld>
             <a:endParaRPr lang="en-US" dirty="0"/>
           </a:p>
@@ -4224,7 +4224,7 @@
           <a:p>
             <a:fld id="{96DFF08F-DC6B-4601-B491-B0F83F6DD2DA}" type="datetimeFigureOut">
               <a:rPr lang="en-US" smtClean="0"/>
-              <a:t>9/6/2018</a:t>
+              <a:t>9/12/2018</a:t>
             </a:fld>
             <a:endParaRPr lang="en-US" dirty="0"/>
           </a:p>
@@ -4401,7 +4401,7 @@
           <a:p>
             <a:fld id="{96DFF08F-DC6B-4601-B491-B0F83F6DD2DA}" type="datetimeFigureOut">
               <a:rPr lang="en-US" smtClean="0"/>
-              <a:t>9/6/2018</a:t>
+              <a:t>9/12/2018</a:t>
             </a:fld>
             <a:endParaRPr lang="en-US" dirty="0"/>
           </a:p>
@@ -4734,7 +4734,7 @@
           <a:p>
             <a:fld id="{96DFF08F-DC6B-4601-B491-B0F83F6DD2DA}" type="datetimeFigureOut">
               <a:rPr lang="en-US" smtClean="0"/>
-              <a:t>9/6/2018</a:t>
+              <a:t>9/12/2018</a:t>
             </a:fld>
             <a:endParaRPr lang="en-US" dirty="0"/>
           </a:p>
@@ -5079,7 +5079,7 @@
           <a:p>
             <a:fld id="{96DFF08F-DC6B-4601-B491-B0F83F6DD2DA}" type="datetimeFigureOut">
               <a:rPr lang="en-US" smtClean="0"/>
-              <a:t>9/6/2018</a:t>
+              <a:t>9/12/2018</a:t>
             </a:fld>
             <a:endParaRPr lang="en-US" dirty="0"/>
           </a:p>
@@ -7197,7 +7197,7 @@
             <a:fld id="{96DFF08F-DC6B-4601-B491-B0F83F6DD2DA}" type="datetimeFigureOut">
               <a:rPr lang="en-US" smtClean="0"/>
               <a:pPr/>
-              <a:t>9/6/2018</a:t>
+              <a:t>9/12/2018</a:t>
             </a:fld>
             <a:endParaRPr lang="en-US" dirty="0"/>
           </a:p>
@@ -16700,7 +16700,7 @@
           <a:p>
             <a:r>
               <a:rPr lang="es-MX" dirty="0"/>
-              <a:t>Manejo de Memoria</a:t>
+              <a:t>Memoria estática</a:t>
             </a:r>
           </a:p>
         </p:txBody>
@@ -16726,7 +16726,28 @@
           <a:bodyPr/>
           <a:lstStyle/>
           <a:p>
-            <a:endParaRPr lang="es-MX" dirty="0"/>
+            <a:r>
+              <a:rPr lang="es-MX" dirty="0"/>
+              <a:t>Para implementar algunas estructuras de datos, primero es necesario tener muy claro como va a ser le manejo de la memoria.</a:t>
+            </a:r>
+          </a:p>
+          <a:p>
+            <a:r>
+              <a:rPr lang="es-MX" dirty="0"/>
+              <a:t>La diferencia entre estructuras estáticas y dinámicas esta en el manejo de memoria. En la memoria estática durante la ejecución del programa el tamaño de la estructura no cambia.</a:t>
+            </a:r>
+          </a:p>
+          <a:p>
+            <a:r>
+              <a:rPr lang="es-MX" dirty="0"/>
+              <a:t>La Estructura que maneja memoria estática son arreglos.</a:t>
+            </a:r>
+          </a:p>
+          <a:p>
+            <a:r>
+              <a:rPr lang="es-MX" dirty="0"/>
+              <a:t>Un arreglo es una colección finita, homogénea y ordenada de elementos. Es finita por que todo arreglo tiene un limite, homogénea por que todos los elementos son del mismo tipo y ordenada por que se puede determinar cual es el enésimo elemento.</a:t>
+            </a:r>
           </a:p>
         </p:txBody>
       </p:sp>
@@ -16781,7 +16802,10 @@
           <a:bodyPr/>
           <a:lstStyle/>
           <a:p>
-            <a:endParaRPr lang="es-MX"/>
+            <a:r>
+              <a:rPr lang="es-MX" dirty="0"/>
+              <a:t>Memoria Dinámica</a:t>
+            </a:r>
           </a:p>
         </p:txBody>
       </p:sp>
@@ -16806,7 +16830,22 @@
           <a:bodyPr/>
           <a:lstStyle/>
           <a:p>
-            <a:endParaRPr lang="es-MX"/>
+            <a:r>
+              <a:rPr lang="es-MX" dirty="0"/>
+              <a:t>En la memoria dinámica durante la ejecución del programa el tamaño de la estructura puede cambiar.</a:t>
+            </a:r>
+          </a:p>
+          <a:p>
+            <a:r>
+              <a:rPr lang="es-MX" dirty="0"/>
+              <a:t>La memoria dinámica es el espacio de almacenamiento que solicita una clase o método en tiempo de ejecución. De esa manera, a medida que el proceso requiere de mas espacio, se solicita al sistema operativo, sin que el proceso se preocupe por donde serán asignados los datos. Ni que espacios de memoria nos entregara el sistema operativo.</a:t>
+            </a:r>
+          </a:p>
+          <a:p>
+            <a:r>
+              <a:rPr lang="es-MX" dirty="0"/>
+              <a:t>Así como existen estructuras de datos estáticas(arreglos),también existen estructuras dinámicas de datos (listas y arboles) </a:t>
+            </a:r>
           </a:p>
         </p:txBody>
       </p:sp>
@@ -16861,7 +16900,10 @@
           <a:bodyPr/>
           <a:lstStyle/>
           <a:p>
-            <a:endParaRPr lang="es-MX"/>
+            <a:r>
+              <a:rPr lang="es-MX" dirty="0"/>
+              <a:t>Memoria Dinámica</a:t>
+            </a:r>
           </a:p>
         </p:txBody>
       </p:sp>
@@ -16886,10 +16928,49 @@
           <a:bodyPr/>
           <a:lstStyle/>
           <a:p>
-            <a:endParaRPr lang="es-MX"/>
+            <a:r>
+              <a:rPr lang="es-MX" dirty="0"/>
+              <a:t>Una lista es un conjunto de nodos que contiene información heterogénea. Los nodos de una lista se encuentran enlazados o relacionados por medios de direccionamientos de memoria como referencia. </a:t>
+            </a:r>
+          </a:p>
+          <a:p>
+            <a:endParaRPr lang="es-MX" dirty="0"/>
+          </a:p>
+          <a:p>
+            <a:endParaRPr lang="es-MX" dirty="0"/>
           </a:p>
         </p:txBody>
       </p:sp>
+      <p:pic>
+        <p:nvPicPr>
+          <p:cNvPr id="4" name="Imagen 3">
+            <a:extLst>
+              <a:ext uri="{FF2B5EF4-FFF2-40B4-BE49-F238E27FC236}">
+                <a16:creationId xmlns:a16="http://schemas.microsoft.com/office/drawing/2014/main" id="{87282747-E727-48A8-A306-86F3F067B452}"/>
+              </a:ext>
+            </a:extLst>
+          </p:cNvPr>
+          <p:cNvPicPr>
+            <a:picLocks noChangeAspect="1"/>
+          </p:cNvPicPr>
+          <p:nvPr/>
+        </p:nvPicPr>
+        <p:blipFill>
+          <a:blip r:embed="rId2"/>
+          <a:stretch>
+            <a:fillRect/>
+          </a:stretch>
+        </p:blipFill>
+        <p:spPr>
+          <a:xfrm>
+            <a:off x="2073566" y="3160622"/>
+            <a:ext cx="9229725" cy="3267075"/>
+          </a:xfrm>
+          <a:prstGeom prst="rect">
+            <a:avLst/>
+          </a:prstGeom>
+        </p:spPr>
+      </p:pic>
     </p:spTree>
     <p:extLst>
       <p:ext uri="{BB962C8B-B14F-4D97-AF65-F5344CB8AC3E}">

</xml_diff>